<commit_message>
Upload files to 'src/docs'
</commit_message>
<xml_diff>
--- a/src/docs/UAE Chapter - Abu Dhabi Open Data Intelligence – High Level Workflow.pptx
+++ b/src/docs/UAE Chapter - Abu Dhabi Open Data Intelligence – High Level Workflow.pptx
@@ -2977,8 +2977,8 @@
         </p:nvSpPr>
         <p:spPr>
           <a:xfrm>
-            <a:off x="259082" y="1193685"/>
-            <a:ext cx="2622367" cy="1815882"/>
+            <a:off x="259082" y="1089181"/>
+            <a:ext cx="2622367" cy="2031325"/>
           </a:xfrm>
           <a:prstGeom prst="rect">
             <a:avLst/>
@@ -2999,8 +2999,29 @@
             <a:pPr algn="ctr"/>
             <a:r>
               <a:rPr lang="en-US" sz="1400" b="1" dirty="0" smtClean="0"/>
-              <a:t>Web Application</a:t>
-            </a:r>
+              <a:t>Web </a:t>
+            </a:r>
+            <a:r>
+              <a:rPr lang="en-US" sz="1400" b="1" dirty="0" smtClean="0"/>
+              <a:t>Application (</a:t>
+            </a:r>
+            <a:r>
+              <a:rPr lang="en-US" sz="1400" b="1" dirty="0" err="1" smtClean="0"/>
+              <a:t>Gradio</a:t>
+            </a:r>
+            <a:r>
+              <a:rPr lang="en-US" sz="1400" b="1" dirty="0" smtClean="0"/>
+              <a:t>, </a:t>
+            </a:r>
+            <a:r>
+              <a:rPr lang="en-US" sz="1400" b="1" dirty="0" err="1" smtClean="0"/>
+              <a:t>Streamlit</a:t>
+            </a:r>
+            <a:r>
+              <a:rPr lang="en-US" sz="1400" b="1" dirty="0" smtClean="0"/>
+              <a:t>, etc.)</a:t>
+            </a:r>
+            <a:endParaRPr lang="en-US" sz="1400" b="1" dirty="0" smtClean="0"/>
           </a:p>
           <a:p>
             <a:r>
@@ -3094,7 +3115,7 @@
         <p:spPr>
           <a:xfrm flipV="1">
             <a:off x="2881449" y="2099257"/>
-            <a:ext cx="479519" cy="2369"/>
+            <a:ext cx="479519" cy="5587"/>
           </a:xfrm>
           <a:prstGeom prst="straightConnector1">
             <a:avLst/>

</xml_diff>